<commit_message>
docs(Multiple): Updated based on feedback provided
</commit_message>
<xml_diff>
--- a/ocrApplication/Documentation/ML 2425-10 Creating Text from images with OCR API_Team_Code_Maverick(Individual)-Presentation.pptx
+++ b/ocrApplication/Documentation/ML 2425-10 Creating Text from images with OCR API_Team_Code_Maverick(Individual)-Presentation.pptx
@@ -5,10 +5,10 @@
     <p:sldMasterId id="2147483648" r:id="rId1"/>
   </p:sldMasterIdLst>
   <p:notesMasterIdLst>
-    <p:notesMasterId r:id="rId16"/>
+    <p:notesMasterId r:id="rId17"/>
   </p:notesMasterIdLst>
   <p:handoutMasterIdLst>
-    <p:handoutMasterId r:id="rId17"/>
+    <p:handoutMasterId r:id="rId18"/>
   </p:handoutMasterIdLst>
   <p:sldIdLst>
     <p:sldId id="256" r:id="rId2"/>
@@ -24,7 +24,8 @@
     <p:sldId id="287" r:id="rId12"/>
     <p:sldId id="277" r:id="rId13"/>
     <p:sldId id="291" r:id="rId14"/>
-    <p:sldId id="272" r:id="rId15"/>
+    <p:sldId id="307" r:id="rId15"/>
+    <p:sldId id="272" r:id="rId16"/>
   </p:sldIdLst>
   <p:sldSz cx="12192000" cy="6858000"/>
   <p:notesSz cx="6858000" cy="9144000"/>
@@ -141,6 +142,7 @@
             <p14:sldId id="287"/>
             <p14:sldId id="277"/>
             <p14:sldId id="291"/>
+            <p14:sldId id="307"/>
             <p14:sldId id="272"/>
           </p14:sldIdLst>
         </p14:section>
@@ -3867,7 +3869,7 @@
   <dgm:whole/>
   <dgm:extLst>
     <a:ext uri="http://schemas.microsoft.com/office/drawing/2008/diagram">
-      <dsp:dataModelExt xmlns:dsp="http://schemas.microsoft.com/office/drawing/2008/diagram" relId="rId7" minVer="http://schemas.openxmlformats.org/drawingml/2006/diagram"/>
+      <dsp:dataModelExt xmlns:dsp="http://schemas.microsoft.com/office/drawing/2008/diagram" relId="rId8" minVer="http://schemas.openxmlformats.org/drawingml/2006/diagram"/>
     </a:ext>
   </dgm:extLst>
 </dgm:dataModel>
@@ -4340,7 +4342,7 @@
   <dgm:whole/>
   <dgm:extLst>
     <a:ext uri="http://schemas.microsoft.com/office/drawing/2008/diagram">
-      <dsp:dataModelExt xmlns:dsp="http://schemas.microsoft.com/office/drawing/2008/diagram" relId="rId7" minVer="http://schemas.openxmlformats.org/drawingml/2006/diagram"/>
+      <dsp:dataModelExt xmlns:dsp="http://schemas.microsoft.com/office/drawing/2008/diagram" relId="rId8" minVer="http://schemas.openxmlformats.org/drawingml/2006/diagram"/>
     </a:ext>
   </dgm:extLst>
 </dgm:dataModel>
@@ -10042,7 +10044,7 @@
           <a:p>
             <a:fld id="{E9050BBF-5635-4B44-A52E-5A8776895F0F}" type="datetimeFigureOut">
               <a:rPr lang="en-DE" smtClean="0"/>
-              <a:t>26.03.25</a:t>
+              <a:t>27.03.25</a:t>
             </a:fld>
             <a:endParaRPr lang="en-DE"/>
           </a:p>
@@ -10220,7 +10222,7 @@
           <a:p>
             <a:fld id="{71ECBD75-61D0-F94D-A7C7-5B90DFDF53B9}" type="datetimeFigureOut">
               <a:rPr lang="en-DE" smtClean="0"/>
-              <a:t>26.03.25</a:t>
+              <a:t>27.03.25</a:t>
             </a:fld>
             <a:endParaRPr lang="en-DE"/>
           </a:p>
@@ -10573,6 +10575,453 @@
 </p:notes>
 </file>
 
+<file path=ppt/notesSlides/notesSlide10.xml><?xml version="1.0" encoding="utf-8"?>
+<p:notes xmlns:a="http://schemas.openxmlformats.org/drawingml/2006/main" xmlns:r="http://schemas.openxmlformats.org/officeDocument/2006/relationships" xmlns:p="http://schemas.openxmlformats.org/presentationml/2006/main">
+  <p:cSld>
+    <p:spTree>
+      <p:nvGrpSpPr>
+        <p:cNvPr id="1" name=""/>
+        <p:cNvGrpSpPr/>
+        <p:nvPr/>
+      </p:nvGrpSpPr>
+      <p:grpSpPr>
+        <a:xfrm>
+          <a:off x="0" y="0"/>
+          <a:ext cx="0" cy="0"/>
+          <a:chOff x="0" y="0"/>
+          <a:chExt cx="0" cy="0"/>
+        </a:xfrm>
+      </p:grpSpPr>
+      <p:sp>
+        <p:nvSpPr>
+          <p:cNvPr id="2" name="Slide Image Placeholder 1"/>
+          <p:cNvSpPr>
+            <a:spLocks noGrp="1" noRot="1" noChangeAspect="1"/>
+          </p:cNvSpPr>
+          <p:nvPr>
+            <p:ph type="sldImg"/>
+          </p:nvPr>
+        </p:nvSpPr>
+        <p:spPr/>
+      </p:sp>
+      <p:sp>
+        <p:nvSpPr>
+          <p:cNvPr id="3" name="Notes Placeholder 2"/>
+          <p:cNvSpPr>
+            <a:spLocks noGrp="1"/>
+          </p:cNvSpPr>
+          <p:nvPr>
+            <p:ph type="body" idx="1"/>
+          </p:nvPr>
+        </p:nvSpPr>
+        <p:spPr/>
+        <p:txBody>
+          <a:bodyPr/>
+          <a:lstStyle/>
+          <a:p>
+            <a:endParaRPr lang="en-GB" dirty="0"/>
+          </a:p>
+        </p:txBody>
+      </p:sp>
+      <p:sp>
+        <p:nvSpPr>
+          <p:cNvPr id="4" name="Slide Number Placeholder 3"/>
+          <p:cNvSpPr>
+            <a:spLocks noGrp="1"/>
+          </p:cNvSpPr>
+          <p:nvPr>
+            <p:ph type="sldNum" sz="quarter" idx="5"/>
+          </p:nvPr>
+        </p:nvSpPr>
+        <p:spPr/>
+        <p:txBody>
+          <a:bodyPr/>
+          <a:lstStyle/>
+          <a:p>
+            <a:fld id="{C1663E2B-A71A-994A-9617-04C39E1FAE85}" type="slidenum">
+              <a:rPr lang="en-DE" smtClean="0"/>
+              <a:t>11</a:t>
+            </a:fld>
+            <a:endParaRPr lang="en-DE"/>
+          </a:p>
+        </p:txBody>
+      </p:sp>
+    </p:spTree>
+    <p:extLst>
+      <p:ext uri="{BB962C8B-B14F-4D97-AF65-F5344CB8AC3E}">
+        <p14:creationId xmlns:p14="http://schemas.microsoft.com/office/powerpoint/2010/main" val="1542172507"/>
+      </p:ext>
+    </p:extLst>
+  </p:cSld>
+  <p:clrMapOvr>
+    <a:masterClrMapping/>
+  </p:clrMapOvr>
+</p:notes>
+</file>
+
+<file path=ppt/notesSlides/notesSlide11.xml><?xml version="1.0" encoding="utf-8"?>
+<p:notes xmlns:a="http://schemas.openxmlformats.org/drawingml/2006/main" xmlns:r="http://schemas.openxmlformats.org/officeDocument/2006/relationships" xmlns:p="http://schemas.openxmlformats.org/presentationml/2006/main">
+  <p:cSld>
+    <p:spTree>
+      <p:nvGrpSpPr>
+        <p:cNvPr id="1" name=""/>
+        <p:cNvGrpSpPr/>
+        <p:nvPr/>
+      </p:nvGrpSpPr>
+      <p:grpSpPr>
+        <a:xfrm>
+          <a:off x="0" y="0"/>
+          <a:ext cx="0" cy="0"/>
+          <a:chOff x="0" y="0"/>
+          <a:chExt cx="0" cy="0"/>
+        </a:xfrm>
+      </p:grpSpPr>
+      <p:sp>
+        <p:nvSpPr>
+          <p:cNvPr id="2" name="Slide Image Placeholder 1"/>
+          <p:cNvSpPr>
+            <a:spLocks noGrp="1" noRot="1" noChangeAspect="1"/>
+          </p:cNvSpPr>
+          <p:nvPr>
+            <p:ph type="sldImg"/>
+          </p:nvPr>
+        </p:nvSpPr>
+        <p:spPr/>
+      </p:sp>
+      <p:sp>
+        <p:nvSpPr>
+          <p:cNvPr id="3" name="Notes Placeholder 2"/>
+          <p:cNvSpPr>
+            <a:spLocks noGrp="1"/>
+          </p:cNvSpPr>
+          <p:nvPr>
+            <p:ph type="body" idx="1"/>
+          </p:nvPr>
+        </p:nvSpPr>
+        <p:spPr/>
+        <p:txBody>
+          <a:bodyPr/>
+          <a:lstStyle/>
+          <a:p>
+            <a:pPr>
+              <a:buNone/>
+            </a:pPr>
+            <a:endParaRPr lang="en-GB" dirty="0"/>
+          </a:p>
+        </p:txBody>
+      </p:sp>
+      <p:sp>
+        <p:nvSpPr>
+          <p:cNvPr id="4" name="Slide Number Placeholder 3"/>
+          <p:cNvSpPr>
+            <a:spLocks noGrp="1"/>
+          </p:cNvSpPr>
+          <p:nvPr>
+            <p:ph type="sldNum" sz="quarter" idx="5"/>
+          </p:nvPr>
+        </p:nvSpPr>
+        <p:spPr/>
+        <p:txBody>
+          <a:bodyPr/>
+          <a:lstStyle/>
+          <a:p>
+            <a:fld id="{C1663E2B-A71A-994A-9617-04C39E1FAE85}" type="slidenum">
+              <a:rPr lang="en-DE" smtClean="0"/>
+              <a:t>12</a:t>
+            </a:fld>
+            <a:endParaRPr lang="en-DE"/>
+          </a:p>
+        </p:txBody>
+      </p:sp>
+    </p:spTree>
+    <p:extLst>
+      <p:ext uri="{BB962C8B-B14F-4D97-AF65-F5344CB8AC3E}">
+        <p14:creationId xmlns:p14="http://schemas.microsoft.com/office/powerpoint/2010/main" val="2962031911"/>
+      </p:ext>
+    </p:extLst>
+  </p:cSld>
+  <p:clrMapOvr>
+    <a:masterClrMapping/>
+  </p:clrMapOvr>
+</p:notes>
+</file>
+
+<file path=ppt/notesSlides/notesSlide12.xml><?xml version="1.0" encoding="utf-8"?>
+<p:notes xmlns:a="http://schemas.openxmlformats.org/drawingml/2006/main" xmlns:r="http://schemas.openxmlformats.org/officeDocument/2006/relationships" xmlns:p="http://schemas.openxmlformats.org/presentationml/2006/main">
+  <p:cSld>
+    <p:spTree>
+      <p:nvGrpSpPr>
+        <p:cNvPr id="1" name=""/>
+        <p:cNvGrpSpPr/>
+        <p:nvPr/>
+      </p:nvGrpSpPr>
+      <p:grpSpPr>
+        <a:xfrm>
+          <a:off x="0" y="0"/>
+          <a:ext cx="0" cy="0"/>
+          <a:chOff x="0" y="0"/>
+          <a:chExt cx="0" cy="0"/>
+        </a:xfrm>
+      </p:grpSpPr>
+      <p:sp>
+        <p:nvSpPr>
+          <p:cNvPr id="2" name="Slide Image Placeholder 1"/>
+          <p:cNvSpPr>
+            <a:spLocks noGrp="1" noRot="1" noChangeAspect="1"/>
+          </p:cNvSpPr>
+          <p:nvPr>
+            <p:ph type="sldImg"/>
+          </p:nvPr>
+        </p:nvSpPr>
+        <p:spPr/>
+      </p:sp>
+      <p:sp>
+        <p:nvSpPr>
+          <p:cNvPr id="3" name="Notes Placeholder 2"/>
+          <p:cNvSpPr>
+            <a:spLocks noGrp="1"/>
+          </p:cNvSpPr>
+          <p:nvPr>
+            <p:ph type="body" idx="1"/>
+          </p:nvPr>
+        </p:nvSpPr>
+        <p:spPr/>
+        <p:txBody>
+          <a:bodyPr/>
+          <a:lstStyle/>
+          <a:p>
+            <a:endParaRPr lang="en-GB" dirty="0"/>
+          </a:p>
+        </p:txBody>
+      </p:sp>
+      <p:sp>
+        <p:nvSpPr>
+          <p:cNvPr id="4" name="Slide Number Placeholder 3"/>
+          <p:cNvSpPr>
+            <a:spLocks noGrp="1"/>
+          </p:cNvSpPr>
+          <p:nvPr>
+            <p:ph type="sldNum" sz="quarter" idx="5"/>
+          </p:nvPr>
+        </p:nvSpPr>
+        <p:spPr/>
+        <p:txBody>
+          <a:bodyPr/>
+          <a:lstStyle/>
+          <a:p>
+            <a:fld id="{C1663E2B-A71A-994A-9617-04C39E1FAE85}" type="slidenum">
+              <a:rPr lang="en-DE" smtClean="0"/>
+              <a:t>13</a:t>
+            </a:fld>
+            <a:endParaRPr lang="en-DE"/>
+          </a:p>
+        </p:txBody>
+      </p:sp>
+    </p:spTree>
+    <p:extLst>
+      <p:ext uri="{BB962C8B-B14F-4D97-AF65-F5344CB8AC3E}">
+        <p14:creationId xmlns:p14="http://schemas.microsoft.com/office/powerpoint/2010/main" val="2203567805"/>
+      </p:ext>
+    </p:extLst>
+  </p:cSld>
+  <p:clrMapOvr>
+    <a:masterClrMapping/>
+  </p:clrMapOvr>
+</p:notes>
+</file>
+
+<file path=ppt/notesSlides/notesSlide13.xml><?xml version="1.0" encoding="utf-8"?>
+<p:notes xmlns:a="http://schemas.openxmlformats.org/drawingml/2006/main" xmlns:r="http://schemas.openxmlformats.org/officeDocument/2006/relationships" xmlns:p="http://schemas.openxmlformats.org/presentationml/2006/main">
+  <p:cSld>
+    <p:spTree>
+      <p:nvGrpSpPr>
+        <p:cNvPr id="1" name="">
+          <a:extLst>
+            <a:ext uri="{FF2B5EF4-FFF2-40B4-BE49-F238E27FC236}">
+              <a16:creationId xmlns:a16="http://schemas.microsoft.com/office/drawing/2014/main" id="{6C4A1A4E-7115-FB3D-7B7C-0848D8C030EF}"/>
+            </a:ext>
+          </a:extLst>
+        </p:cNvPr>
+        <p:cNvGrpSpPr/>
+        <p:nvPr/>
+      </p:nvGrpSpPr>
+      <p:grpSpPr>
+        <a:xfrm>
+          <a:off x="0" y="0"/>
+          <a:ext cx="0" cy="0"/>
+          <a:chOff x="0" y="0"/>
+          <a:chExt cx="0" cy="0"/>
+        </a:xfrm>
+      </p:grpSpPr>
+      <p:sp>
+        <p:nvSpPr>
+          <p:cNvPr id="2" name="Slide Image Placeholder 1">
+            <a:extLst>
+              <a:ext uri="{FF2B5EF4-FFF2-40B4-BE49-F238E27FC236}">
+                <a16:creationId xmlns:a16="http://schemas.microsoft.com/office/drawing/2014/main" id="{C8E60C7D-34C7-57DC-70F0-2AC7D2A6AFD4}"/>
+              </a:ext>
+            </a:extLst>
+          </p:cNvPr>
+          <p:cNvSpPr>
+            <a:spLocks noGrp="1" noRot="1" noChangeAspect="1"/>
+          </p:cNvSpPr>
+          <p:nvPr>
+            <p:ph type="sldImg"/>
+          </p:nvPr>
+        </p:nvSpPr>
+        <p:spPr/>
+      </p:sp>
+      <p:sp>
+        <p:nvSpPr>
+          <p:cNvPr id="3" name="Notes Placeholder 2">
+            <a:extLst>
+              <a:ext uri="{FF2B5EF4-FFF2-40B4-BE49-F238E27FC236}">
+                <a16:creationId xmlns:a16="http://schemas.microsoft.com/office/drawing/2014/main" id="{447765B9-D493-F55B-C9D3-E5C6010CC3B1}"/>
+              </a:ext>
+            </a:extLst>
+          </p:cNvPr>
+          <p:cNvSpPr>
+            <a:spLocks noGrp="1"/>
+          </p:cNvSpPr>
+          <p:nvPr>
+            <p:ph type="body" idx="1"/>
+          </p:nvPr>
+        </p:nvSpPr>
+        <p:spPr/>
+        <p:txBody>
+          <a:bodyPr/>
+          <a:lstStyle/>
+          <a:p>
+            <a:endParaRPr lang="en-GB" dirty="0"/>
+          </a:p>
+        </p:txBody>
+      </p:sp>
+      <p:sp>
+        <p:nvSpPr>
+          <p:cNvPr id="4" name="Slide Number Placeholder 3">
+            <a:extLst>
+              <a:ext uri="{FF2B5EF4-FFF2-40B4-BE49-F238E27FC236}">
+                <a16:creationId xmlns:a16="http://schemas.microsoft.com/office/drawing/2014/main" id="{68828902-F747-0A06-C511-AC5074A015BF}"/>
+              </a:ext>
+            </a:extLst>
+          </p:cNvPr>
+          <p:cNvSpPr>
+            <a:spLocks noGrp="1"/>
+          </p:cNvSpPr>
+          <p:nvPr>
+            <p:ph type="sldNum" sz="quarter" idx="5"/>
+          </p:nvPr>
+        </p:nvSpPr>
+        <p:spPr/>
+        <p:txBody>
+          <a:bodyPr/>
+          <a:lstStyle/>
+          <a:p>
+            <a:fld id="{C1663E2B-A71A-994A-9617-04C39E1FAE85}" type="slidenum">
+              <a:rPr lang="en-DE" smtClean="0"/>
+              <a:t>14</a:t>
+            </a:fld>
+            <a:endParaRPr lang="en-DE"/>
+          </a:p>
+        </p:txBody>
+      </p:sp>
+    </p:spTree>
+    <p:extLst>
+      <p:ext uri="{BB962C8B-B14F-4D97-AF65-F5344CB8AC3E}">
+        <p14:creationId xmlns:p14="http://schemas.microsoft.com/office/powerpoint/2010/main" val="3321639057"/>
+      </p:ext>
+    </p:extLst>
+  </p:cSld>
+  <p:clrMapOvr>
+    <a:masterClrMapping/>
+  </p:clrMapOvr>
+</p:notes>
+</file>
+
+<file path=ppt/notesSlides/notesSlide14.xml><?xml version="1.0" encoding="utf-8"?>
+<p:notes xmlns:a="http://schemas.openxmlformats.org/drawingml/2006/main" xmlns:r="http://schemas.openxmlformats.org/officeDocument/2006/relationships" xmlns:p="http://schemas.openxmlformats.org/presentationml/2006/main">
+  <p:cSld>
+    <p:spTree>
+      <p:nvGrpSpPr>
+        <p:cNvPr id="1" name=""/>
+        <p:cNvGrpSpPr/>
+        <p:nvPr/>
+      </p:nvGrpSpPr>
+      <p:grpSpPr>
+        <a:xfrm>
+          <a:off x="0" y="0"/>
+          <a:ext cx="0" cy="0"/>
+          <a:chOff x="0" y="0"/>
+          <a:chExt cx="0" cy="0"/>
+        </a:xfrm>
+      </p:grpSpPr>
+      <p:sp>
+        <p:nvSpPr>
+          <p:cNvPr id="2" name="Slide Image Placeholder 1"/>
+          <p:cNvSpPr>
+            <a:spLocks noGrp="1" noRot="1" noChangeAspect="1"/>
+          </p:cNvSpPr>
+          <p:nvPr>
+            <p:ph type="sldImg"/>
+          </p:nvPr>
+        </p:nvSpPr>
+        <p:spPr/>
+      </p:sp>
+      <p:sp>
+        <p:nvSpPr>
+          <p:cNvPr id="3" name="Notes Placeholder 2"/>
+          <p:cNvSpPr>
+            <a:spLocks noGrp="1"/>
+          </p:cNvSpPr>
+          <p:nvPr>
+            <p:ph type="body" idx="1"/>
+          </p:nvPr>
+        </p:nvSpPr>
+        <p:spPr/>
+        <p:txBody>
+          <a:bodyPr/>
+          <a:lstStyle/>
+          <a:p>
+            <a:endParaRPr lang="en-GB" dirty="0"/>
+          </a:p>
+        </p:txBody>
+      </p:sp>
+      <p:sp>
+        <p:nvSpPr>
+          <p:cNvPr id="4" name="Slide Number Placeholder 3"/>
+          <p:cNvSpPr>
+            <a:spLocks noGrp="1"/>
+          </p:cNvSpPr>
+          <p:nvPr>
+            <p:ph type="sldNum" sz="quarter" idx="5"/>
+          </p:nvPr>
+        </p:nvSpPr>
+        <p:spPr/>
+        <p:txBody>
+          <a:bodyPr/>
+          <a:lstStyle/>
+          <a:p>
+            <a:fld id="{C1663E2B-A71A-994A-9617-04C39E1FAE85}" type="slidenum">
+              <a:rPr lang="en-DE" smtClean="0"/>
+              <a:t>15</a:t>
+            </a:fld>
+            <a:endParaRPr lang="en-DE"/>
+          </a:p>
+        </p:txBody>
+      </p:sp>
+    </p:spTree>
+    <p:extLst>
+      <p:ext uri="{BB962C8B-B14F-4D97-AF65-F5344CB8AC3E}">
+        <p14:creationId xmlns:p14="http://schemas.microsoft.com/office/powerpoint/2010/main" val="4289920961"/>
+      </p:ext>
+    </p:extLst>
+  </p:cSld>
+  <p:clrMapOvr>
+    <a:masterClrMapping/>
+  </p:clrMapOvr>
+</p:notes>
+</file>
+
 <file path=ppt/notesSlides/notesSlide2.xml><?xml version="1.0" encoding="utf-8"?>
 <p:notes xmlns:a="http://schemas.openxmlformats.org/drawingml/2006/main" xmlns:r="http://schemas.openxmlformats.org/officeDocument/2006/relationships" xmlns:p="http://schemas.openxmlformats.org/presentationml/2006/main">
   <p:cSld>
@@ -10722,7 +11171,7 @@
           <a:p>
             <a:fld id="{C1663E2B-A71A-994A-9617-04C39E1FAE85}" type="slidenum">
               <a:rPr lang="en-DE" smtClean="0"/>
-              <a:t>6</a:t>
+              <a:t>3</a:t>
             </a:fld>
             <a:endParaRPr lang="en-DE"/>
           </a:p>
@@ -10731,7 +11180,7 @@
     </p:spTree>
     <p:extLst>
       <p:ext uri="{BB962C8B-B14F-4D97-AF65-F5344CB8AC3E}">
-        <p14:creationId xmlns:p14="http://schemas.microsoft.com/office/powerpoint/2010/main" val="270098441"/>
+        <p14:creationId xmlns:p14="http://schemas.microsoft.com/office/powerpoint/2010/main" val="514390433"/>
       </p:ext>
     </p:extLst>
   </p:cSld>
@@ -10806,7 +11255,7 @@
           <a:p>
             <a:fld id="{C1663E2B-A71A-994A-9617-04C39E1FAE85}" type="slidenum">
               <a:rPr lang="en-DE" smtClean="0"/>
-              <a:t>11</a:t>
+              <a:t>4</a:t>
             </a:fld>
             <a:endParaRPr lang="en-DE"/>
           </a:p>
@@ -10815,7 +11264,7 @@
     </p:spTree>
     <p:extLst>
       <p:ext uri="{BB962C8B-B14F-4D97-AF65-F5344CB8AC3E}">
-        <p14:creationId xmlns:p14="http://schemas.microsoft.com/office/powerpoint/2010/main" val="1542172507"/>
+        <p14:creationId xmlns:p14="http://schemas.microsoft.com/office/powerpoint/2010/main" val="3856672893"/>
       </p:ext>
     </p:extLst>
   </p:cSld>
@@ -10869,6 +11318,9 @@
           <a:bodyPr/>
           <a:lstStyle/>
           <a:p>
+            <a:pPr>
+              <a:buNone/>
+            </a:pPr>
             <a:endParaRPr lang="en-GB" dirty="0"/>
           </a:p>
         </p:txBody>
@@ -10890,7 +11342,7 @@
           <a:p>
             <a:fld id="{C1663E2B-A71A-994A-9617-04C39E1FAE85}" type="slidenum">
               <a:rPr lang="en-DE" smtClean="0"/>
-              <a:t>14</a:t>
+              <a:t>5</a:t>
             </a:fld>
             <a:endParaRPr lang="en-DE"/>
           </a:p>
@@ -10899,7 +11351,352 @@
     </p:spTree>
     <p:extLst>
       <p:ext uri="{BB962C8B-B14F-4D97-AF65-F5344CB8AC3E}">
-        <p14:creationId xmlns:p14="http://schemas.microsoft.com/office/powerpoint/2010/main" val="4289920961"/>
+        <p14:creationId xmlns:p14="http://schemas.microsoft.com/office/powerpoint/2010/main" val="620964366"/>
+      </p:ext>
+    </p:extLst>
+  </p:cSld>
+  <p:clrMapOvr>
+    <a:masterClrMapping/>
+  </p:clrMapOvr>
+</p:notes>
+</file>
+
+<file path=ppt/notesSlides/notesSlide6.xml><?xml version="1.0" encoding="utf-8"?>
+<p:notes xmlns:a="http://schemas.openxmlformats.org/drawingml/2006/main" xmlns:r="http://schemas.openxmlformats.org/officeDocument/2006/relationships" xmlns:p="http://schemas.openxmlformats.org/presentationml/2006/main">
+  <p:cSld>
+    <p:spTree>
+      <p:nvGrpSpPr>
+        <p:cNvPr id="1" name=""/>
+        <p:cNvGrpSpPr/>
+        <p:nvPr/>
+      </p:nvGrpSpPr>
+      <p:grpSpPr>
+        <a:xfrm>
+          <a:off x="0" y="0"/>
+          <a:ext cx="0" cy="0"/>
+          <a:chOff x="0" y="0"/>
+          <a:chExt cx="0" cy="0"/>
+        </a:xfrm>
+      </p:grpSpPr>
+      <p:sp>
+        <p:nvSpPr>
+          <p:cNvPr id="2" name="Slide Image Placeholder 1"/>
+          <p:cNvSpPr>
+            <a:spLocks noGrp="1" noRot="1" noChangeAspect="1"/>
+          </p:cNvSpPr>
+          <p:nvPr>
+            <p:ph type="sldImg"/>
+          </p:nvPr>
+        </p:nvSpPr>
+        <p:spPr/>
+      </p:sp>
+      <p:sp>
+        <p:nvSpPr>
+          <p:cNvPr id="3" name="Notes Placeholder 2"/>
+          <p:cNvSpPr>
+            <a:spLocks noGrp="1"/>
+          </p:cNvSpPr>
+          <p:nvPr>
+            <p:ph type="body" idx="1"/>
+          </p:nvPr>
+        </p:nvSpPr>
+        <p:spPr/>
+        <p:txBody>
+          <a:bodyPr/>
+          <a:lstStyle/>
+          <a:p>
+            <a:pPr>
+              <a:buNone/>
+            </a:pPr>
+            <a:endParaRPr lang="en-GB" dirty="0"/>
+          </a:p>
+        </p:txBody>
+      </p:sp>
+      <p:sp>
+        <p:nvSpPr>
+          <p:cNvPr id="4" name="Slide Number Placeholder 3"/>
+          <p:cNvSpPr>
+            <a:spLocks noGrp="1"/>
+          </p:cNvSpPr>
+          <p:nvPr>
+            <p:ph type="sldNum" sz="quarter" idx="5"/>
+          </p:nvPr>
+        </p:nvSpPr>
+        <p:spPr/>
+        <p:txBody>
+          <a:bodyPr/>
+          <a:lstStyle/>
+          <a:p>
+            <a:fld id="{C1663E2B-A71A-994A-9617-04C39E1FAE85}" type="slidenum">
+              <a:rPr lang="en-DE" smtClean="0"/>
+              <a:t>6</a:t>
+            </a:fld>
+            <a:endParaRPr lang="en-DE"/>
+          </a:p>
+        </p:txBody>
+      </p:sp>
+    </p:spTree>
+    <p:extLst>
+      <p:ext uri="{BB962C8B-B14F-4D97-AF65-F5344CB8AC3E}">
+        <p14:creationId xmlns:p14="http://schemas.microsoft.com/office/powerpoint/2010/main" val="270098441"/>
+      </p:ext>
+    </p:extLst>
+  </p:cSld>
+  <p:clrMapOvr>
+    <a:masterClrMapping/>
+  </p:clrMapOvr>
+</p:notes>
+</file>
+
+<file path=ppt/notesSlides/notesSlide7.xml><?xml version="1.0" encoding="utf-8"?>
+<p:notes xmlns:a="http://schemas.openxmlformats.org/drawingml/2006/main" xmlns:r="http://schemas.openxmlformats.org/officeDocument/2006/relationships" xmlns:p="http://schemas.openxmlformats.org/presentationml/2006/main">
+  <p:cSld>
+    <p:spTree>
+      <p:nvGrpSpPr>
+        <p:cNvPr id="1" name=""/>
+        <p:cNvGrpSpPr/>
+        <p:nvPr/>
+      </p:nvGrpSpPr>
+      <p:grpSpPr>
+        <a:xfrm>
+          <a:off x="0" y="0"/>
+          <a:ext cx="0" cy="0"/>
+          <a:chOff x="0" y="0"/>
+          <a:chExt cx="0" cy="0"/>
+        </a:xfrm>
+      </p:grpSpPr>
+      <p:sp>
+        <p:nvSpPr>
+          <p:cNvPr id="2" name="Slide Image Placeholder 1"/>
+          <p:cNvSpPr>
+            <a:spLocks noGrp="1" noRot="1" noChangeAspect="1"/>
+          </p:cNvSpPr>
+          <p:nvPr>
+            <p:ph type="sldImg"/>
+          </p:nvPr>
+        </p:nvSpPr>
+        <p:spPr/>
+      </p:sp>
+      <p:sp>
+        <p:nvSpPr>
+          <p:cNvPr id="3" name="Notes Placeholder 2"/>
+          <p:cNvSpPr>
+            <a:spLocks noGrp="1"/>
+          </p:cNvSpPr>
+          <p:nvPr>
+            <p:ph type="body" idx="1"/>
+          </p:nvPr>
+        </p:nvSpPr>
+        <p:spPr/>
+        <p:txBody>
+          <a:bodyPr/>
+          <a:lstStyle/>
+          <a:p>
+            <a:pPr>
+              <a:buNone/>
+            </a:pPr>
+            <a:endParaRPr lang="en-GB" dirty="0"/>
+          </a:p>
+        </p:txBody>
+      </p:sp>
+      <p:sp>
+        <p:nvSpPr>
+          <p:cNvPr id="4" name="Slide Number Placeholder 3"/>
+          <p:cNvSpPr>
+            <a:spLocks noGrp="1"/>
+          </p:cNvSpPr>
+          <p:nvPr>
+            <p:ph type="sldNum" sz="quarter" idx="5"/>
+          </p:nvPr>
+        </p:nvSpPr>
+        <p:spPr/>
+        <p:txBody>
+          <a:bodyPr/>
+          <a:lstStyle/>
+          <a:p>
+            <a:fld id="{C1663E2B-A71A-994A-9617-04C39E1FAE85}" type="slidenum">
+              <a:rPr lang="en-DE" smtClean="0"/>
+              <a:t>7</a:t>
+            </a:fld>
+            <a:endParaRPr lang="en-DE"/>
+          </a:p>
+        </p:txBody>
+      </p:sp>
+    </p:spTree>
+    <p:extLst>
+      <p:ext uri="{BB962C8B-B14F-4D97-AF65-F5344CB8AC3E}">
+        <p14:creationId xmlns:p14="http://schemas.microsoft.com/office/powerpoint/2010/main" val="4251209218"/>
+      </p:ext>
+    </p:extLst>
+  </p:cSld>
+  <p:clrMapOvr>
+    <a:masterClrMapping/>
+  </p:clrMapOvr>
+</p:notes>
+</file>
+
+<file path=ppt/notesSlides/notesSlide8.xml><?xml version="1.0" encoding="utf-8"?>
+<p:notes xmlns:a="http://schemas.openxmlformats.org/drawingml/2006/main" xmlns:r="http://schemas.openxmlformats.org/officeDocument/2006/relationships" xmlns:p="http://schemas.openxmlformats.org/presentationml/2006/main">
+  <p:cSld>
+    <p:spTree>
+      <p:nvGrpSpPr>
+        <p:cNvPr id="1" name=""/>
+        <p:cNvGrpSpPr/>
+        <p:nvPr/>
+      </p:nvGrpSpPr>
+      <p:grpSpPr>
+        <a:xfrm>
+          <a:off x="0" y="0"/>
+          <a:ext cx="0" cy="0"/>
+          <a:chOff x="0" y="0"/>
+          <a:chExt cx="0" cy="0"/>
+        </a:xfrm>
+      </p:grpSpPr>
+      <p:sp>
+        <p:nvSpPr>
+          <p:cNvPr id="2" name="Slide Image Placeholder 1"/>
+          <p:cNvSpPr>
+            <a:spLocks noGrp="1" noRot="1" noChangeAspect="1"/>
+          </p:cNvSpPr>
+          <p:nvPr>
+            <p:ph type="sldImg"/>
+          </p:nvPr>
+        </p:nvSpPr>
+        <p:spPr/>
+      </p:sp>
+      <p:sp>
+        <p:nvSpPr>
+          <p:cNvPr id="3" name="Notes Placeholder 2"/>
+          <p:cNvSpPr>
+            <a:spLocks noGrp="1"/>
+          </p:cNvSpPr>
+          <p:nvPr>
+            <p:ph type="body" idx="1"/>
+          </p:nvPr>
+        </p:nvSpPr>
+        <p:spPr/>
+        <p:txBody>
+          <a:bodyPr/>
+          <a:lstStyle/>
+          <a:p>
+            <a:pPr>
+              <a:buNone/>
+            </a:pPr>
+            <a:endParaRPr lang="en-GB" dirty="0"/>
+          </a:p>
+        </p:txBody>
+      </p:sp>
+      <p:sp>
+        <p:nvSpPr>
+          <p:cNvPr id="4" name="Slide Number Placeholder 3"/>
+          <p:cNvSpPr>
+            <a:spLocks noGrp="1"/>
+          </p:cNvSpPr>
+          <p:nvPr>
+            <p:ph type="sldNum" sz="quarter" idx="5"/>
+          </p:nvPr>
+        </p:nvSpPr>
+        <p:spPr/>
+        <p:txBody>
+          <a:bodyPr/>
+          <a:lstStyle/>
+          <a:p>
+            <a:fld id="{C1663E2B-A71A-994A-9617-04C39E1FAE85}" type="slidenum">
+              <a:rPr lang="en-DE" smtClean="0"/>
+              <a:t>8</a:t>
+            </a:fld>
+            <a:endParaRPr lang="en-DE"/>
+          </a:p>
+        </p:txBody>
+      </p:sp>
+    </p:spTree>
+    <p:extLst>
+      <p:ext uri="{BB962C8B-B14F-4D97-AF65-F5344CB8AC3E}">
+        <p14:creationId xmlns:p14="http://schemas.microsoft.com/office/powerpoint/2010/main" val="1777193517"/>
+      </p:ext>
+    </p:extLst>
+  </p:cSld>
+  <p:clrMapOvr>
+    <a:masterClrMapping/>
+  </p:clrMapOvr>
+</p:notes>
+</file>
+
+<file path=ppt/notesSlides/notesSlide9.xml><?xml version="1.0" encoding="utf-8"?>
+<p:notes xmlns:a="http://schemas.openxmlformats.org/drawingml/2006/main" xmlns:r="http://schemas.openxmlformats.org/officeDocument/2006/relationships" xmlns:p="http://schemas.openxmlformats.org/presentationml/2006/main">
+  <p:cSld>
+    <p:spTree>
+      <p:nvGrpSpPr>
+        <p:cNvPr id="1" name=""/>
+        <p:cNvGrpSpPr/>
+        <p:nvPr/>
+      </p:nvGrpSpPr>
+      <p:grpSpPr>
+        <a:xfrm>
+          <a:off x="0" y="0"/>
+          <a:ext cx="0" cy="0"/>
+          <a:chOff x="0" y="0"/>
+          <a:chExt cx="0" cy="0"/>
+        </a:xfrm>
+      </p:grpSpPr>
+      <p:sp>
+        <p:nvSpPr>
+          <p:cNvPr id="2" name="Slide Image Placeholder 1"/>
+          <p:cNvSpPr>
+            <a:spLocks noGrp="1" noRot="1" noChangeAspect="1"/>
+          </p:cNvSpPr>
+          <p:nvPr>
+            <p:ph type="sldImg"/>
+          </p:nvPr>
+        </p:nvSpPr>
+        <p:spPr/>
+      </p:sp>
+      <p:sp>
+        <p:nvSpPr>
+          <p:cNvPr id="3" name="Notes Placeholder 2"/>
+          <p:cNvSpPr>
+            <a:spLocks noGrp="1"/>
+          </p:cNvSpPr>
+          <p:nvPr>
+            <p:ph type="body" idx="1"/>
+          </p:nvPr>
+        </p:nvSpPr>
+        <p:spPr/>
+        <p:txBody>
+          <a:bodyPr/>
+          <a:lstStyle/>
+          <a:p>
+            <a:endParaRPr lang="en-GB" dirty="0"/>
+          </a:p>
+        </p:txBody>
+      </p:sp>
+      <p:sp>
+        <p:nvSpPr>
+          <p:cNvPr id="4" name="Slide Number Placeholder 3"/>
+          <p:cNvSpPr>
+            <a:spLocks noGrp="1"/>
+          </p:cNvSpPr>
+          <p:nvPr>
+            <p:ph type="sldNum" sz="quarter" idx="5"/>
+          </p:nvPr>
+        </p:nvSpPr>
+        <p:spPr/>
+        <p:txBody>
+          <a:bodyPr/>
+          <a:lstStyle/>
+          <a:p>
+            <a:fld id="{C1663E2B-A71A-994A-9617-04C39E1FAE85}" type="slidenum">
+              <a:rPr lang="en-DE" smtClean="0"/>
+              <a:t>10</a:t>
+            </a:fld>
+            <a:endParaRPr lang="en-DE"/>
+          </a:p>
+        </p:txBody>
+      </p:sp>
+    </p:spTree>
+    <p:extLst>
+      <p:ext uri="{BB962C8B-B14F-4D97-AF65-F5344CB8AC3E}">
+        <p14:creationId xmlns:p14="http://schemas.microsoft.com/office/powerpoint/2010/main" val="3057597828"/>
       </p:ext>
     </p:extLst>
   </p:cSld>
@@ -11058,7 +11855,7 @@
           <a:p>
             <a:fld id="{E70BB040-1417-463D-8924-20454A1D4474}" type="datetimeFigureOut">
               <a:rPr lang="en-IN" smtClean="0"/>
-              <a:t>26/03/25</a:t>
+              <a:t>27/03/25</a:t>
             </a:fld>
             <a:endParaRPr lang="en-IN"/>
           </a:p>
@@ -11258,7 +12055,7 @@
           <a:p>
             <a:fld id="{E70BB040-1417-463D-8924-20454A1D4474}" type="datetimeFigureOut">
               <a:rPr lang="en-IN" smtClean="0"/>
-              <a:t>26/03/25</a:t>
+              <a:t>27/03/25</a:t>
             </a:fld>
             <a:endParaRPr lang="en-IN"/>
           </a:p>
@@ -11468,7 +12265,7 @@
           <a:p>
             <a:fld id="{E70BB040-1417-463D-8924-20454A1D4474}" type="datetimeFigureOut">
               <a:rPr lang="en-IN" smtClean="0"/>
-              <a:t>26/03/25</a:t>
+              <a:t>27/03/25</a:t>
             </a:fld>
             <a:endParaRPr lang="en-IN"/>
           </a:p>
@@ -11668,7 +12465,7 @@
           <a:p>
             <a:fld id="{E70BB040-1417-463D-8924-20454A1D4474}" type="datetimeFigureOut">
               <a:rPr lang="en-IN" smtClean="0"/>
-              <a:t>26/03/25</a:t>
+              <a:t>27/03/25</a:t>
             </a:fld>
             <a:endParaRPr lang="en-IN"/>
           </a:p>
@@ -11944,7 +12741,7 @@
           <a:p>
             <a:fld id="{E70BB040-1417-463D-8924-20454A1D4474}" type="datetimeFigureOut">
               <a:rPr lang="en-IN" smtClean="0"/>
-              <a:t>26/03/25</a:t>
+              <a:t>27/03/25</a:t>
             </a:fld>
             <a:endParaRPr lang="en-IN"/>
           </a:p>
@@ -12212,7 +13009,7 @@
           <a:p>
             <a:fld id="{E70BB040-1417-463D-8924-20454A1D4474}" type="datetimeFigureOut">
               <a:rPr lang="en-IN" smtClean="0"/>
-              <a:t>26/03/25</a:t>
+              <a:t>27/03/25</a:t>
             </a:fld>
             <a:endParaRPr lang="en-IN"/>
           </a:p>
@@ -12627,7 +13424,7 @@
           <a:p>
             <a:fld id="{E70BB040-1417-463D-8924-20454A1D4474}" type="datetimeFigureOut">
               <a:rPr lang="en-IN" smtClean="0"/>
-              <a:t>26/03/25</a:t>
+              <a:t>27/03/25</a:t>
             </a:fld>
             <a:endParaRPr lang="en-IN"/>
           </a:p>
@@ -12769,7 +13566,7 @@
           <a:p>
             <a:fld id="{E70BB040-1417-463D-8924-20454A1D4474}" type="datetimeFigureOut">
               <a:rPr lang="en-IN" smtClean="0"/>
-              <a:t>26/03/25</a:t>
+              <a:t>27/03/25</a:t>
             </a:fld>
             <a:endParaRPr lang="en-IN"/>
           </a:p>
@@ -12882,7 +13679,7 @@
           <a:p>
             <a:fld id="{E70BB040-1417-463D-8924-20454A1D4474}" type="datetimeFigureOut">
               <a:rPr lang="en-IN" smtClean="0"/>
-              <a:t>26/03/25</a:t>
+              <a:t>27/03/25</a:t>
             </a:fld>
             <a:endParaRPr lang="en-IN"/>
           </a:p>
@@ -13195,7 +13992,7 @@
           <a:p>
             <a:fld id="{E70BB040-1417-463D-8924-20454A1D4474}" type="datetimeFigureOut">
               <a:rPr lang="en-IN" smtClean="0"/>
-              <a:t>26/03/25</a:t>
+              <a:t>27/03/25</a:t>
             </a:fld>
             <a:endParaRPr lang="en-IN"/>
           </a:p>
@@ -13484,7 +14281,7 @@
           <a:p>
             <a:fld id="{E70BB040-1417-463D-8924-20454A1D4474}" type="datetimeFigureOut">
               <a:rPr lang="en-IN" smtClean="0"/>
-              <a:t>26/03/25</a:t>
+              <a:t>27/03/25</a:t>
             </a:fld>
             <a:endParaRPr lang="en-IN"/>
           </a:p>
@@ -13727,7 +14524,7 @@
           <a:p>
             <a:fld id="{E70BB040-1417-463D-8924-20454A1D4474}" type="datetimeFigureOut">
               <a:rPr lang="en-IN" smtClean="0"/>
-              <a:t>26/03/25</a:t>
+              <a:t>27/03/25</a:t>
             </a:fld>
             <a:endParaRPr lang="en-IN"/>
           </a:p>
@@ -14963,7 +15760,7 @@
         </p:nvSpPr>
         <p:spPr>
           <a:xfrm>
-            <a:off x="8810296" y="5679091"/>
+            <a:off x="8414330" y="5679091"/>
             <a:ext cx="7498195" cy="1714773"/>
           </a:xfrm>
           <a:prstGeom prst="rect">
@@ -15709,7 +16506,7 @@
           <p:nvPr/>
         </p:nvPicPr>
         <p:blipFill>
-          <a:blip r:embed="rId2"/>
+          <a:blip r:embed="rId3"/>
           <a:stretch>
             <a:fillRect/>
           </a:stretch>
@@ -16092,7 +16889,7 @@
           <p:nvPr/>
         </p:nvPicPr>
         <p:blipFill>
-          <a:blip r:embed="rId3">
+          <a:blip r:embed="rId4">
             <a:extLst>
               <a:ext uri="{28A0092B-C50C-407E-A947-70E740481C1C}">
                 <a14:useLocalDpi xmlns:a14="http://schemas.microsoft.com/office/drawing/2010/main" val="0"/>
@@ -17741,7 +18538,7 @@
           <p:nvPr/>
         </p:nvPicPr>
         <p:blipFill>
-          <a:blip r:embed="rId2"/>
+          <a:blip r:embed="rId3"/>
           <a:stretch>
             <a:fillRect/>
           </a:stretch>
@@ -18579,7 +19376,7 @@
           <p:nvPr/>
         </p:nvPicPr>
         <p:blipFill>
-          <a:blip r:embed="rId2"/>
+          <a:blip r:embed="rId3"/>
           <a:stretch>
             <a:fillRect/>
           </a:stretch>
@@ -18626,6 +19423,1037 @@
 </file>
 
 <file path=ppt/slides/slide14.xml><?xml version="1.0" encoding="utf-8"?>
+<p:sld xmlns:a="http://schemas.openxmlformats.org/drawingml/2006/main" xmlns:r="http://schemas.openxmlformats.org/officeDocument/2006/relationships" xmlns:p="http://schemas.openxmlformats.org/presentationml/2006/main">
+  <p:cSld>
+    <p:bg>
+      <p:bgPr>
+        <a:solidFill>
+          <a:schemeClr val="bg1"/>
+        </a:solidFill>
+        <a:effectLst/>
+      </p:bgPr>
+    </p:bg>
+    <p:spTree>
+      <p:nvGrpSpPr>
+        <p:cNvPr id="1" name="">
+          <a:extLst>
+            <a:ext uri="{FF2B5EF4-FFF2-40B4-BE49-F238E27FC236}">
+              <a16:creationId xmlns:a16="http://schemas.microsoft.com/office/drawing/2014/main" id="{9CCD89A8-9402-36DD-C061-0116E7FD4412}"/>
+            </a:ext>
+          </a:extLst>
+        </p:cNvPr>
+        <p:cNvGrpSpPr/>
+        <p:nvPr/>
+      </p:nvGrpSpPr>
+      <p:grpSpPr>
+        <a:xfrm>
+          <a:off x="0" y="0"/>
+          <a:ext cx="0" cy="0"/>
+          <a:chOff x="0" y="0"/>
+          <a:chExt cx="0" cy="0"/>
+        </a:xfrm>
+      </p:grpSpPr>
+      <p:sp useBgFill="1">
+        <p:nvSpPr>
+          <p:cNvPr id="71" name="Rectangle 70">
+            <a:extLst>
+              <a:ext uri="{FF2B5EF4-FFF2-40B4-BE49-F238E27FC236}">
+                <a16:creationId xmlns:a16="http://schemas.microsoft.com/office/drawing/2014/main" id="{398F3DEE-0E56-499F-AFAE-C2DA7C2C815B}"/>
+              </a:ext>
+              <a:ext uri="{C183D7F6-B498-43B3-948B-1728B52AA6E4}">
+                <adec:decorative xmlns:adec="http://schemas.microsoft.com/office/drawing/2017/decorative" val="1"/>
+              </a:ext>
+            </a:extLst>
+          </p:cNvPr>
+          <p:cNvSpPr>
+            <a:spLocks noGrp="1" noRot="1" noChangeAspect="1" noMove="1" noResize="1" noEditPoints="1" noAdjustHandles="1" noChangeArrowheads="1" noChangeShapeType="1" noTextEdit="1"/>
+          </p:cNvSpPr>
+          <p:nvPr>
+            <p:extLst>
+              <p:ext uri="{386F3935-93C4-4BCD-93E2-E3B085C9AB24}">
+                <p16:designElem xmlns:p16="http://schemas.microsoft.com/office/powerpoint/2015/main" val="1"/>
+              </p:ext>
+            </p:extLst>
+          </p:nvPr>
+        </p:nvSpPr>
+        <p:spPr>
+          <a:xfrm>
+            <a:off x="0" y="0"/>
+            <a:ext cx="12192000" cy="6858000"/>
+          </a:xfrm>
+          <a:prstGeom prst="rect">
+            <a:avLst/>
+          </a:prstGeom>
+          <a:ln w="12700" cap="flat" cmpd="sng" algn="ctr">
+            <a:noFill/>
+            <a:prstDash val="solid"/>
+            <a:miter lim="800000"/>
+          </a:ln>
+          <a:effectLst/>
+          <a:extLst>
+            <a:ext uri="{91240B29-F687-4F45-9708-019B960494DF}">
+              <a14:hiddenLine xmlns:a14="http://schemas.microsoft.com/office/drawing/2010/main" w="12700" cap="flat" cmpd="sng" algn="ctr">
+                <a:solidFill>
+                  <a:schemeClr val="accent1">
+                    <a:shade val="50000"/>
+                  </a:schemeClr>
+                </a:solidFill>
+                <a:prstDash val="solid"/>
+                <a:miter lim="800000"/>
+              </a14:hiddenLine>
+            </a:ext>
+          </a:extLst>
+        </p:spPr>
+        <p:style>
+          <a:lnRef idx="2">
+            <a:schemeClr val="accent1">
+              <a:shade val="50000"/>
+            </a:schemeClr>
+          </a:lnRef>
+          <a:fillRef idx="1">
+            <a:schemeClr val="accent1"/>
+          </a:fillRef>
+          <a:effectRef idx="0">
+            <a:schemeClr val="accent1"/>
+          </a:effectRef>
+          <a:fontRef idx="minor">
+            <a:schemeClr val="lt1"/>
+          </a:fontRef>
+        </p:style>
+        <p:txBody>
+          <a:bodyPr rtlCol="0" anchor="ctr"/>
+          <a:lstStyle/>
+          <a:p>
+            <a:pPr algn="ctr"/>
+            <a:endParaRPr lang="en-US"/>
+          </a:p>
+        </p:txBody>
+      </p:sp>
+      <p:sp>
+        <p:nvSpPr>
+          <p:cNvPr id="73" name="Rectangle 72">
+            <a:extLst>
+              <a:ext uri="{FF2B5EF4-FFF2-40B4-BE49-F238E27FC236}">
+                <a16:creationId xmlns:a16="http://schemas.microsoft.com/office/drawing/2014/main" id="{E85CCF60-79A2-440A-86A2-1A64A59F7B5C}"/>
+              </a:ext>
+              <a:ext uri="{C183D7F6-B498-43B3-948B-1728B52AA6E4}">
+                <adec:decorative xmlns:adec="http://schemas.microsoft.com/office/drawing/2017/decorative" val="1"/>
+              </a:ext>
+            </a:extLst>
+          </p:cNvPr>
+          <p:cNvSpPr>
+            <a:spLocks noGrp="1" noRot="1" noChangeAspect="1" noMove="1" noResize="1" noEditPoints="1" noAdjustHandles="1" noChangeArrowheads="1" noChangeShapeType="1" noTextEdit="1"/>
+          </p:cNvSpPr>
+          <p:nvPr>
+            <p:extLst>
+              <p:ext uri="{386F3935-93C4-4BCD-93E2-E3B085C9AB24}">
+                <p16:designElem xmlns:p16="http://schemas.microsoft.com/office/powerpoint/2015/main" val="1"/>
+              </p:ext>
+            </p:extLst>
+          </p:nvPr>
+        </p:nvSpPr>
+        <p:spPr>
+          <a:xfrm rot="5400000" flipH="1">
+            <a:off x="-1417539" y="1417538"/>
+            <a:ext cx="6875818" cy="4040744"/>
+          </a:xfrm>
+          <a:prstGeom prst="rect">
+            <a:avLst/>
+          </a:prstGeom>
+          <a:gradFill>
+            <a:gsLst>
+              <a:gs pos="11000">
+                <a:srgbClr val="000000"/>
+              </a:gs>
+              <a:gs pos="100000">
+                <a:schemeClr val="accent1">
+                  <a:lumMod val="75000"/>
+                </a:schemeClr>
+              </a:gs>
+            </a:gsLst>
+            <a:lin ang="18600000" scaled="0"/>
+          </a:gradFill>
+          <a:ln>
+            <a:noFill/>
+          </a:ln>
+        </p:spPr>
+        <p:style>
+          <a:lnRef idx="2">
+            <a:schemeClr val="accent1">
+              <a:shade val="50000"/>
+            </a:schemeClr>
+          </a:lnRef>
+          <a:fillRef idx="1">
+            <a:schemeClr val="accent1"/>
+          </a:fillRef>
+          <a:effectRef idx="0">
+            <a:schemeClr val="accent1"/>
+          </a:effectRef>
+          <a:fontRef idx="minor">
+            <a:schemeClr val="lt1"/>
+          </a:fontRef>
+        </p:style>
+        <p:txBody>
+          <a:bodyPr rtlCol="0" anchor="ctr"/>
+          <a:lstStyle/>
+          <a:p>
+            <a:pPr algn="ctr"/>
+            <a:endParaRPr lang="en-US" dirty="0"/>
+          </a:p>
+        </p:txBody>
+      </p:sp>
+      <p:sp>
+        <p:nvSpPr>
+          <p:cNvPr id="75" name="Rectangle 74">
+            <a:extLst>
+              <a:ext uri="{FF2B5EF4-FFF2-40B4-BE49-F238E27FC236}">
+                <a16:creationId xmlns:a16="http://schemas.microsoft.com/office/drawing/2014/main" id="{3F2162BA-EECD-43E0-99D9-C00B19482E50}"/>
+              </a:ext>
+              <a:ext uri="{C183D7F6-B498-43B3-948B-1728B52AA6E4}">
+                <adec:decorative xmlns:adec="http://schemas.microsoft.com/office/drawing/2017/decorative" val="1"/>
+              </a:ext>
+            </a:extLst>
+          </p:cNvPr>
+          <p:cNvSpPr>
+            <a:spLocks noGrp="1" noRot="1" noChangeAspect="1" noMove="1" noResize="1" noEditPoints="1" noAdjustHandles="1" noChangeArrowheads="1" noChangeShapeType="1" noTextEdit="1"/>
+          </p:cNvSpPr>
+          <p:nvPr>
+            <p:extLst>
+              <p:ext uri="{386F3935-93C4-4BCD-93E2-E3B085C9AB24}">
+                <p16:designElem xmlns:p16="http://schemas.microsoft.com/office/powerpoint/2015/main" val="1"/>
+              </p:ext>
+            </p:extLst>
+          </p:nvPr>
+        </p:nvSpPr>
+        <p:spPr>
+          <a:xfrm flipH="1">
+            <a:off x="457200" y="8482"/>
+            <a:ext cx="3568276" cy="6858000"/>
+          </a:xfrm>
+          <a:prstGeom prst="rect">
+            <a:avLst/>
+          </a:prstGeom>
+          <a:gradFill>
+            <a:gsLst>
+              <a:gs pos="0">
+                <a:schemeClr val="accent1">
+                  <a:alpha val="32000"/>
+                </a:schemeClr>
+              </a:gs>
+              <a:gs pos="70000">
+                <a:srgbClr val="000000">
+                  <a:alpha val="0"/>
+                </a:srgbClr>
+              </a:gs>
+            </a:gsLst>
+            <a:lin ang="6000000" scaled="0"/>
+          </a:gradFill>
+          <a:ln>
+            <a:noFill/>
+          </a:ln>
+        </p:spPr>
+        <p:style>
+          <a:lnRef idx="2">
+            <a:schemeClr val="accent1">
+              <a:shade val="50000"/>
+            </a:schemeClr>
+          </a:lnRef>
+          <a:fillRef idx="1">
+            <a:schemeClr val="accent1"/>
+          </a:fillRef>
+          <a:effectRef idx="0">
+            <a:schemeClr val="accent1"/>
+          </a:effectRef>
+          <a:fontRef idx="minor">
+            <a:schemeClr val="lt1"/>
+          </a:fontRef>
+        </p:style>
+        <p:txBody>
+          <a:bodyPr rtlCol="0" anchor="ctr"/>
+          <a:lstStyle/>
+          <a:p>
+            <a:pPr algn="ctr"/>
+            <a:endParaRPr lang="en-US" dirty="0"/>
+          </a:p>
+        </p:txBody>
+      </p:sp>
+      <p:sp>
+        <p:nvSpPr>
+          <p:cNvPr id="77" name="Freeform: Shape 76">
+            <a:extLst>
+              <a:ext uri="{FF2B5EF4-FFF2-40B4-BE49-F238E27FC236}">
+                <a16:creationId xmlns:a16="http://schemas.microsoft.com/office/drawing/2014/main" id="{160DB805-F71F-46BB-A8CC-74F6D8306F98}"/>
+              </a:ext>
+              <a:ext uri="{C183D7F6-B498-43B3-948B-1728B52AA6E4}">
+                <adec:decorative xmlns:adec="http://schemas.microsoft.com/office/drawing/2017/decorative" val="1"/>
+              </a:ext>
+            </a:extLst>
+          </p:cNvPr>
+          <p:cNvSpPr>
+            <a:spLocks noGrp="1" noRot="1" noChangeAspect="1" noMove="1" noResize="1" noEditPoints="1" noAdjustHandles="1" noChangeArrowheads="1" noChangeShapeType="1" noTextEdit="1"/>
+          </p:cNvSpPr>
+          <p:nvPr>
+            <p:extLst>
+              <p:ext uri="{386F3935-93C4-4BCD-93E2-E3B085C9AB24}">
+                <p16:designElem xmlns:p16="http://schemas.microsoft.com/office/powerpoint/2015/main" val="1"/>
+              </p:ext>
+            </p:extLst>
+          </p:nvPr>
+        </p:nvSpPr>
+        <p:spPr>
+          <a:xfrm rot="6097846">
+            <a:off x="-747355" y="1201312"/>
+            <a:ext cx="4808302" cy="4088666"/>
+          </a:xfrm>
+          <a:custGeom>
+            <a:avLst/>
+            <a:gdLst>
+              <a:gd name="connsiteX0" fmla="*/ 48844 w 4808302"/>
+              <a:gd name="connsiteY0" fmla="*/ 2888671 h 4088666"/>
+              <a:gd name="connsiteX1" fmla="*/ 0 w 4808302"/>
+              <a:gd name="connsiteY1" fmla="*/ 2404151 h 4088666"/>
+              <a:gd name="connsiteX2" fmla="*/ 2404151 w 4808302"/>
+              <a:gd name="connsiteY2" fmla="*/ 0 h 4088666"/>
+              <a:gd name="connsiteX3" fmla="*/ 4808302 w 4808302"/>
+              <a:gd name="connsiteY3" fmla="*/ 2404151 h 4088666"/>
+              <a:gd name="connsiteX4" fmla="*/ 4700216 w 4808302"/>
+              <a:gd name="connsiteY4" fmla="*/ 3119072 h 4088666"/>
+              <a:gd name="connsiteX5" fmla="*/ 4643143 w 4808302"/>
+              <a:gd name="connsiteY5" fmla="*/ 3275009 h 4088666"/>
+              <a:gd name="connsiteX6" fmla="*/ 690093 w 4808302"/>
+              <a:gd name="connsiteY6" fmla="*/ 4088666 h 4088666"/>
+              <a:gd name="connsiteX7" fmla="*/ 548991 w 4808302"/>
+              <a:gd name="connsiteY7" fmla="*/ 3933414 h 4088666"/>
+              <a:gd name="connsiteX8" fmla="*/ 48844 w 4808302"/>
+              <a:gd name="connsiteY8" fmla="*/ 2888671 h 4088666"/>
+            </a:gdLst>
+            <a:ahLst/>
+            <a:cxnLst>
+              <a:cxn ang="0">
+                <a:pos x="connsiteX0" y="connsiteY0"/>
+              </a:cxn>
+              <a:cxn ang="0">
+                <a:pos x="connsiteX1" y="connsiteY1"/>
+              </a:cxn>
+              <a:cxn ang="0">
+                <a:pos x="connsiteX2" y="connsiteY2"/>
+              </a:cxn>
+              <a:cxn ang="0">
+                <a:pos x="connsiteX3" y="connsiteY3"/>
+              </a:cxn>
+              <a:cxn ang="0">
+                <a:pos x="connsiteX4" y="connsiteY4"/>
+              </a:cxn>
+              <a:cxn ang="0">
+                <a:pos x="connsiteX5" y="connsiteY5"/>
+              </a:cxn>
+              <a:cxn ang="0">
+                <a:pos x="connsiteX6" y="connsiteY6"/>
+              </a:cxn>
+              <a:cxn ang="0">
+                <a:pos x="connsiteX7" y="connsiteY7"/>
+              </a:cxn>
+              <a:cxn ang="0">
+                <a:pos x="connsiteX8" y="connsiteY8"/>
+              </a:cxn>
+            </a:cxnLst>
+            <a:rect l="l" t="t" r="r" b="b"/>
+            <a:pathLst>
+              <a:path w="4808302" h="4088666">
+                <a:moveTo>
+                  <a:pt x="48844" y="2888671"/>
+                </a:moveTo>
+                <a:cubicBezTo>
+                  <a:pt x="16818" y="2732167"/>
+                  <a:pt x="0" y="2570123"/>
+                  <a:pt x="0" y="2404151"/>
+                </a:cubicBezTo>
+                <a:cubicBezTo>
+                  <a:pt x="0" y="1076375"/>
+                  <a:pt x="1076375" y="0"/>
+                  <a:pt x="2404151" y="0"/>
+                </a:cubicBezTo>
+                <a:cubicBezTo>
+                  <a:pt x="3731927" y="0"/>
+                  <a:pt x="4808302" y="1076375"/>
+                  <a:pt x="4808302" y="2404151"/>
+                </a:cubicBezTo>
+                <a:cubicBezTo>
+                  <a:pt x="4808302" y="2653109"/>
+                  <a:pt x="4770461" y="2893229"/>
+                  <a:pt x="4700216" y="3119072"/>
+                </a:cubicBezTo>
+                <a:lnTo>
+                  <a:pt x="4643143" y="3275009"/>
+                </a:lnTo>
+                <a:lnTo>
+                  <a:pt x="690093" y="4088666"/>
+                </a:lnTo>
+                <a:lnTo>
+                  <a:pt x="548991" y="3933414"/>
+                </a:lnTo>
+                <a:cubicBezTo>
+                  <a:pt x="304015" y="3636572"/>
+                  <a:pt x="128908" y="3279932"/>
+                  <a:pt x="48844" y="2888671"/>
+                </a:cubicBezTo>
+                <a:close/>
+              </a:path>
+            </a:pathLst>
+          </a:custGeom>
+          <a:gradFill>
+            <a:gsLst>
+              <a:gs pos="39000">
+                <a:schemeClr val="accent1">
+                  <a:lumMod val="60000"/>
+                  <a:lumOff val="40000"/>
+                  <a:alpha val="0"/>
+                </a:schemeClr>
+              </a:gs>
+              <a:gs pos="100000">
+                <a:schemeClr val="accent1">
+                  <a:lumMod val="75000"/>
+                  <a:alpha val="26000"/>
+                </a:schemeClr>
+              </a:gs>
+            </a:gsLst>
+            <a:lin ang="16800000" scaled="0"/>
+          </a:gradFill>
+          <a:ln>
+            <a:noFill/>
+          </a:ln>
+        </p:spPr>
+        <p:style>
+          <a:lnRef idx="2">
+            <a:schemeClr val="accent1">
+              <a:shade val="50000"/>
+            </a:schemeClr>
+          </a:lnRef>
+          <a:fillRef idx="1">
+            <a:schemeClr val="accent1"/>
+          </a:fillRef>
+          <a:effectRef idx="0">
+            <a:schemeClr val="accent1"/>
+          </a:effectRef>
+          <a:fontRef idx="minor">
+            <a:schemeClr val="lt1"/>
+          </a:fontRef>
+        </p:style>
+        <p:txBody>
+          <a:bodyPr wrap="square" rtlCol="0" anchor="ctr">
+            <a:noAutofit/>
+          </a:bodyPr>
+          <a:lstStyle/>
+          <a:p>
+            <a:pPr algn="ctr"/>
+            <a:endParaRPr lang="en-US" dirty="0"/>
+          </a:p>
+        </p:txBody>
+      </p:sp>
+      <p:sp>
+        <p:nvSpPr>
+          <p:cNvPr id="79" name="Rectangle 78">
+            <a:extLst>
+              <a:ext uri="{FF2B5EF4-FFF2-40B4-BE49-F238E27FC236}">
+                <a16:creationId xmlns:a16="http://schemas.microsoft.com/office/drawing/2014/main" id="{6F91054C-3439-420E-88EB-F0A5637EC5C4}"/>
+              </a:ext>
+              <a:ext uri="{C183D7F6-B498-43B3-948B-1728B52AA6E4}">
+                <adec:decorative xmlns:adec="http://schemas.microsoft.com/office/drawing/2017/decorative" val="1"/>
+              </a:ext>
+            </a:extLst>
+          </p:cNvPr>
+          <p:cNvSpPr>
+            <a:spLocks noGrp="1" noRot="1" noChangeAspect="1" noMove="1" noResize="1" noEditPoints="1" noAdjustHandles="1" noChangeArrowheads="1" noChangeShapeType="1" noTextEdit="1"/>
+          </p:cNvSpPr>
+          <p:nvPr>
+            <p:extLst>
+              <p:ext uri="{386F3935-93C4-4BCD-93E2-E3B085C9AB24}">
+                <p16:designElem xmlns:p16="http://schemas.microsoft.com/office/powerpoint/2015/main" val="1"/>
+              </p:ext>
+            </p:extLst>
+          </p:nvPr>
+        </p:nvSpPr>
+        <p:spPr>
+          <a:xfrm rot="16200000">
+            <a:off x="-159565" y="2659404"/>
+            <a:ext cx="4355594" cy="4040742"/>
+          </a:xfrm>
+          <a:prstGeom prst="rect">
+            <a:avLst/>
+          </a:prstGeom>
+          <a:gradFill>
+            <a:gsLst>
+              <a:gs pos="0">
+                <a:schemeClr val="accent1">
+                  <a:alpha val="24000"/>
+                </a:schemeClr>
+              </a:gs>
+              <a:gs pos="100000">
+                <a:schemeClr val="accent1">
+                  <a:lumMod val="50000"/>
+                  <a:alpha val="0"/>
+                </a:schemeClr>
+              </a:gs>
+            </a:gsLst>
+            <a:lin ang="11400000" scaled="0"/>
+          </a:gradFill>
+          <a:ln>
+            <a:noFill/>
+          </a:ln>
+        </p:spPr>
+        <p:style>
+          <a:lnRef idx="2">
+            <a:schemeClr val="accent1">
+              <a:shade val="50000"/>
+            </a:schemeClr>
+          </a:lnRef>
+          <a:fillRef idx="1">
+            <a:schemeClr val="accent1"/>
+          </a:fillRef>
+          <a:effectRef idx="0">
+            <a:schemeClr val="accent1"/>
+          </a:effectRef>
+          <a:fontRef idx="minor">
+            <a:schemeClr val="lt1"/>
+          </a:fontRef>
+        </p:style>
+        <p:txBody>
+          <a:bodyPr rtlCol="0" anchor="ctr"/>
+          <a:lstStyle/>
+          <a:p>
+            <a:pPr algn="ctr"/>
+            <a:endParaRPr lang="en-US"/>
+          </a:p>
+        </p:txBody>
+      </p:sp>
+      <p:sp>
+        <p:nvSpPr>
+          <p:cNvPr id="7" name="Title 1">
+            <a:extLst>
+              <a:ext uri="{FF2B5EF4-FFF2-40B4-BE49-F238E27FC236}">
+                <a16:creationId xmlns:a16="http://schemas.microsoft.com/office/drawing/2014/main" id="{465CAA4B-305E-DF0C-AED0-3727CF1C3BD7}"/>
+              </a:ext>
+            </a:extLst>
+          </p:cNvPr>
+          <p:cNvSpPr txBox="1"/>
+          <p:nvPr/>
+        </p:nvSpPr>
+        <p:spPr>
+          <a:xfrm>
+            <a:off x="716676" y="75918"/>
+            <a:ext cx="2895573" cy="2834223"/>
+          </a:xfrm>
+          <a:prstGeom prst="rect">
+            <a:avLst/>
+          </a:prstGeom>
+        </p:spPr>
+        <p:txBody>
+          <a:bodyPr vert="horz" lIns="91440" tIns="45720" rIns="91440" bIns="45720" rtlCol="0" anchor="t">
+            <a:normAutofit/>
+          </a:bodyPr>
+          <a:lstStyle/>
+          <a:p>
+            <a:pPr>
+              <a:lnSpc>
+                <a:spcPct val="90000"/>
+              </a:lnSpc>
+              <a:spcBef>
+                <a:spcPct val="0"/>
+              </a:spcBef>
+              <a:spcAft>
+                <a:spcPts val="600"/>
+              </a:spcAft>
+              <a:defRPr sz="1800" b="0" i="0" u="none" strike="noStrike" kern="0" cap="none" spc="0" baseline="0">
+                <a:solidFill>
+                  <a:srgbClr val="000000"/>
+                </a:solidFill>
+                <a:uFillTx/>
+              </a:defRPr>
+            </a:pPr>
+            <a:r>
+              <a:rPr lang="en-US" sz="4000" dirty="0">
+                <a:solidFill>
+                  <a:srgbClr val="FFFFFF"/>
+                </a:solidFill>
+                <a:latin typeface="+mj-lt"/>
+                <a:ea typeface="+mj-ea"/>
+                <a:cs typeface="+mj-cs"/>
+              </a:rPr>
+              <a:t>Output Screenshots</a:t>
+            </a:r>
+          </a:p>
+          <a:p>
+            <a:pPr>
+              <a:lnSpc>
+                <a:spcPct val="90000"/>
+              </a:lnSpc>
+              <a:spcBef>
+                <a:spcPct val="0"/>
+              </a:spcBef>
+              <a:spcAft>
+                <a:spcPts val="600"/>
+              </a:spcAft>
+              <a:defRPr sz="1800" b="0" i="0" u="none" strike="noStrike" kern="0" cap="none" spc="0" baseline="0">
+                <a:solidFill>
+                  <a:srgbClr val="000000"/>
+                </a:solidFill>
+                <a:uFillTx/>
+              </a:defRPr>
+            </a:pPr>
+            <a:r>
+              <a:rPr lang="en-US" sz="4000" dirty="0">
+                <a:solidFill>
+                  <a:srgbClr val="FFFFFF"/>
+                </a:solidFill>
+                <a:latin typeface="+mj-lt"/>
+                <a:ea typeface="+mj-ea"/>
+                <a:cs typeface="+mj-cs"/>
+              </a:rPr>
+              <a:t>And</a:t>
+            </a:r>
+          </a:p>
+          <a:p>
+            <a:pPr>
+              <a:lnSpc>
+                <a:spcPct val="90000"/>
+              </a:lnSpc>
+              <a:spcBef>
+                <a:spcPct val="0"/>
+              </a:spcBef>
+              <a:spcAft>
+                <a:spcPts val="600"/>
+              </a:spcAft>
+              <a:defRPr sz="1800" b="0" i="0" u="none" strike="noStrike" kern="0" cap="none" spc="0" baseline="0">
+                <a:solidFill>
+                  <a:srgbClr val="000000"/>
+                </a:solidFill>
+                <a:uFillTx/>
+              </a:defRPr>
+            </a:pPr>
+            <a:r>
+              <a:rPr lang="en-US" sz="4000" dirty="0">
+                <a:solidFill>
+                  <a:srgbClr val="FFFFFF"/>
+                </a:solidFill>
+                <a:latin typeface="+mj-lt"/>
+                <a:ea typeface="+mj-ea"/>
+                <a:cs typeface="+mj-cs"/>
+              </a:rPr>
+              <a:t>Demo</a:t>
+            </a:r>
+          </a:p>
+        </p:txBody>
+      </p:sp>
+      <p:pic>
+        <p:nvPicPr>
+          <p:cNvPr id="14" name="Picture 13" descr="A screenshot of a computer&#10;&#10;AI-generated content may be incorrect.">
+            <a:extLst>
+              <a:ext uri="{FF2B5EF4-FFF2-40B4-BE49-F238E27FC236}">
+                <a16:creationId xmlns:a16="http://schemas.microsoft.com/office/drawing/2014/main" id="{0EDB98B9-388B-5103-B0FD-612C89DE8EF0}"/>
+              </a:ext>
+            </a:extLst>
+          </p:cNvPr>
+          <p:cNvPicPr>
+            <a:picLocks noChangeAspect="1"/>
+          </p:cNvPicPr>
+          <p:nvPr/>
+        </p:nvPicPr>
+        <p:blipFill>
+          <a:blip r:embed="rId3">
+            <a:extLst>
+              <a:ext uri="{28A0092B-C50C-407E-A947-70E740481C1C}">
+                <a14:useLocalDpi xmlns:a14="http://schemas.microsoft.com/office/drawing/2010/main" val="0"/>
+              </a:ext>
+            </a:extLst>
+          </a:blip>
+          <a:stretch>
+            <a:fillRect/>
+          </a:stretch>
+        </p:blipFill>
+        <p:spPr>
+          <a:xfrm>
+            <a:off x="4215712" y="3536620"/>
+            <a:ext cx="3039945" cy="2386355"/>
+          </a:xfrm>
+          <a:prstGeom prst="rect">
+            <a:avLst/>
+          </a:prstGeom>
+        </p:spPr>
+      </p:pic>
+      <p:pic>
+        <p:nvPicPr>
+          <p:cNvPr id="6" name="Picture 5" descr="A screenshot of a computer&#10;&#10;AI-generated content may be incorrect.">
+            <a:extLst>
+              <a:ext uri="{FF2B5EF4-FFF2-40B4-BE49-F238E27FC236}">
+                <a16:creationId xmlns:a16="http://schemas.microsoft.com/office/drawing/2014/main" id="{06D0CAE6-A539-F8E4-6130-85D1A32B1A14}"/>
+              </a:ext>
+            </a:extLst>
+          </p:cNvPr>
+          <p:cNvPicPr>
+            <a:picLocks noChangeAspect="1"/>
+          </p:cNvPicPr>
+          <p:nvPr/>
+        </p:nvPicPr>
+        <p:blipFill>
+          <a:blip r:embed="rId4">
+            <a:extLst>
+              <a:ext uri="{28A0092B-C50C-407E-A947-70E740481C1C}">
+                <a14:useLocalDpi xmlns:a14="http://schemas.microsoft.com/office/drawing/2010/main" val="0"/>
+              </a:ext>
+            </a:extLst>
+          </a:blip>
+          <a:stretch>
+            <a:fillRect/>
+          </a:stretch>
+        </p:blipFill>
+        <p:spPr>
+          <a:xfrm>
+            <a:off x="112113" y="2501550"/>
+            <a:ext cx="3902676" cy="2673331"/>
+          </a:xfrm>
+          <a:prstGeom prst="rect">
+            <a:avLst/>
+          </a:prstGeom>
+        </p:spPr>
+      </p:pic>
+      <p:pic>
+        <p:nvPicPr>
+          <p:cNvPr id="16" name="Picture 15" descr="A screenshot of a computer&#10;&#10;AI-generated content may be incorrect.">
+            <a:extLst>
+              <a:ext uri="{FF2B5EF4-FFF2-40B4-BE49-F238E27FC236}">
+                <a16:creationId xmlns:a16="http://schemas.microsoft.com/office/drawing/2014/main" id="{33A2083F-AB7E-3F5C-8E1F-1E8FAF0E87C9}"/>
+              </a:ext>
+            </a:extLst>
+          </p:cNvPr>
+          <p:cNvPicPr>
+            <a:picLocks noChangeAspect="1"/>
+          </p:cNvPicPr>
+          <p:nvPr/>
+        </p:nvPicPr>
+        <p:blipFill>
+          <a:blip r:embed="rId5">
+            <a:extLst>
+              <a:ext uri="{28A0092B-C50C-407E-A947-70E740481C1C}">
+                <a14:useLocalDpi xmlns:a14="http://schemas.microsoft.com/office/drawing/2010/main" val="0"/>
+              </a:ext>
+            </a:extLst>
+          </a:blip>
+          <a:stretch>
+            <a:fillRect/>
+          </a:stretch>
+        </p:blipFill>
+        <p:spPr>
+          <a:xfrm>
+            <a:off x="4202833" y="908714"/>
+            <a:ext cx="6406174" cy="1969897"/>
+          </a:xfrm>
+          <a:prstGeom prst="rect">
+            <a:avLst/>
+          </a:prstGeom>
+        </p:spPr>
+      </p:pic>
+      <p:pic>
+        <p:nvPicPr>
+          <p:cNvPr id="12" name="Picture 11" descr="A group of words on a white background&#10;&#10;AI-generated content may be incorrect.">
+            <a:extLst>
+              <a:ext uri="{FF2B5EF4-FFF2-40B4-BE49-F238E27FC236}">
+                <a16:creationId xmlns:a16="http://schemas.microsoft.com/office/drawing/2014/main" id="{D57FAFCC-4DB3-758B-E9FB-47B20FA9A2E0}"/>
+              </a:ext>
+            </a:extLst>
+          </p:cNvPr>
+          <p:cNvPicPr>
+            <a:picLocks noChangeAspect="1"/>
+          </p:cNvPicPr>
+          <p:nvPr/>
+        </p:nvPicPr>
+        <p:blipFill>
+          <a:blip r:embed="rId6">
+            <a:extLst>
+              <a:ext uri="{28A0092B-C50C-407E-A947-70E740481C1C}">
+                <a14:useLocalDpi xmlns:a14="http://schemas.microsoft.com/office/drawing/2010/main" val="0"/>
+              </a:ext>
+            </a:extLst>
+          </a:blip>
+          <a:stretch>
+            <a:fillRect/>
+          </a:stretch>
+        </p:blipFill>
+        <p:spPr>
+          <a:xfrm>
+            <a:off x="7514537" y="3573623"/>
+            <a:ext cx="3553903" cy="2425483"/>
+          </a:xfrm>
+          <a:prstGeom prst="rect">
+            <a:avLst/>
+          </a:prstGeom>
+        </p:spPr>
+      </p:pic>
+      <p:pic>
+        <p:nvPicPr>
+          <p:cNvPr id="4" name="image5.png">
+            <a:extLst>
+              <a:ext uri="{FF2B5EF4-FFF2-40B4-BE49-F238E27FC236}">
+                <a16:creationId xmlns:a16="http://schemas.microsoft.com/office/drawing/2014/main" id="{8E4271F9-739C-DA17-F42B-40D94A0851AF}"/>
+              </a:ext>
+            </a:extLst>
+          </p:cNvPr>
+          <p:cNvPicPr>
+            <a:picLocks noChangeAspect="1"/>
+          </p:cNvPicPr>
+          <p:nvPr/>
+        </p:nvPicPr>
+        <p:blipFill>
+          <a:blip r:embed="rId7"/>
+          <a:stretch>
+            <a:fillRect/>
+          </a:stretch>
+        </p:blipFill>
+        <p:spPr>
+          <a:xfrm>
+            <a:off x="10458329" y="57021"/>
+            <a:ext cx="1705099" cy="606491"/>
+          </a:xfrm>
+          <a:prstGeom prst="rect">
+            <a:avLst/>
+          </a:prstGeom>
+          <a:noFill/>
+          <a:ln>
+            <a:noFill/>
+          </a:ln>
+        </p:spPr>
+        <p:style>
+          <a:lnRef idx="0">
+            <a:scrgbClr r="0" g="0" b="0"/>
+          </a:lnRef>
+          <a:fillRef idx="0">
+            <a:scrgbClr r="0" g="0" b="0"/>
+          </a:fillRef>
+          <a:effectRef idx="0">
+            <a:scrgbClr r="0" g="0" b="0"/>
+          </a:effectRef>
+          <a:fontRef idx="minor">
+            <a:schemeClr val="dk1"/>
+          </a:fontRef>
+        </p:style>
+      </p:pic>
+      <p:sp>
+        <p:nvSpPr>
+          <p:cNvPr id="17" name="TextBox 16">
+            <a:extLst>
+              <a:ext uri="{FF2B5EF4-FFF2-40B4-BE49-F238E27FC236}">
+                <a16:creationId xmlns:a16="http://schemas.microsoft.com/office/drawing/2014/main" id="{4827FB5C-5E80-297A-3DEB-609A1E6FBDEE}"/>
+              </a:ext>
+            </a:extLst>
+          </p:cNvPr>
+          <p:cNvSpPr txBox="1"/>
+          <p:nvPr/>
+        </p:nvSpPr>
+        <p:spPr>
+          <a:xfrm>
+            <a:off x="647534" y="5289740"/>
+            <a:ext cx="2741393" cy="461665"/>
+          </a:xfrm>
+          <a:prstGeom prst="rect">
+            <a:avLst/>
+          </a:prstGeom>
+          <a:noFill/>
+        </p:spPr>
+        <p:txBody>
+          <a:bodyPr wrap="square">
+            <a:spAutoFit/>
+          </a:bodyPr>
+          <a:lstStyle/>
+          <a:p>
+            <a:pPr algn="ctr"/>
+            <a:r>
+              <a:rPr lang="en-US" sz="1200" dirty="0">
+                <a:solidFill>
+                  <a:schemeClr val="bg1"/>
+                </a:solidFill>
+                <a:effectLst/>
+                <a:latin typeface="Times New Roman" panose="02020603050405020304" pitchFamily="18" charset="0"/>
+                <a:ea typeface="SimSun" panose="02010600030101010101" pitchFamily="2" charset="-122"/>
+              </a:rPr>
+              <a:t>Figure 6: Graphical User Interface</a:t>
+            </a:r>
+          </a:p>
+          <a:p>
+            <a:pPr algn="ctr"/>
+            <a:endParaRPr lang="en-US" sz="1200" dirty="0">
+              <a:solidFill>
+                <a:schemeClr val="bg1"/>
+              </a:solidFill>
+              <a:effectLst/>
+              <a:latin typeface="Times New Roman" panose="02020603050405020304" pitchFamily="18" charset="0"/>
+              <a:ea typeface="SimSun" panose="02010600030101010101" pitchFamily="2" charset="-122"/>
+            </a:endParaRPr>
+          </a:p>
+        </p:txBody>
+      </p:sp>
+      <p:sp>
+        <p:nvSpPr>
+          <p:cNvPr id="18" name="TextBox 17">
+            <a:extLst>
+              <a:ext uri="{FF2B5EF4-FFF2-40B4-BE49-F238E27FC236}">
+                <a16:creationId xmlns:a16="http://schemas.microsoft.com/office/drawing/2014/main" id="{5EB2EA18-57D9-28A8-039B-D6DC052842E6}"/>
+              </a:ext>
+            </a:extLst>
+          </p:cNvPr>
+          <p:cNvSpPr txBox="1"/>
+          <p:nvPr/>
+        </p:nvSpPr>
+        <p:spPr>
+          <a:xfrm>
+            <a:off x="6035223" y="2877936"/>
+            <a:ext cx="2741393" cy="276999"/>
+          </a:xfrm>
+          <a:prstGeom prst="rect">
+            <a:avLst/>
+          </a:prstGeom>
+          <a:noFill/>
+        </p:spPr>
+        <p:txBody>
+          <a:bodyPr wrap="square">
+            <a:spAutoFit/>
+          </a:bodyPr>
+          <a:lstStyle/>
+          <a:p>
+            <a:pPr algn="ctr"/>
+            <a:r>
+              <a:rPr lang="en-US" sz="1200" dirty="0">
+                <a:effectLst/>
+                <a:latin typeface="Times New Roman" panose="02020603050405020304" pitchFamily="18" charset="0"/>
+                <a:ea typeface="SimSun" panose="02010600030101010101" pitchFamily="2" charset="-122"/>
+              </a:rPr>
+              <a:t>Figure 6: Command Line Interface</a:t>
+            </a:r>
+          </a:p>
+        </p:txBody>
+      </p:sp>
+      <p:sp>
+        <p:nvSpPr>
+          <p:cNvPr id="19" name="TextBox 18">
+            <a:extLst>
+              <a:ext uri="{FF2B5EF4-FFF2-40B4-BE49-F238E27FC236}">
+                <a16:creationId xmlns:a16="http://schemas.microsoft.com/office/drawing/2014/main" id="{7831AA7A-F284-1144-BE2C-622EE48C3090}"/>
+              </a:ext>
+            </a:extLst>
+          </p:cNvPr>
+          <p:cNvSpPr txBox="1"/>
+          <p:nvPr/>
+        </p:nvSpPr>
+        <p:spPr>
+          <a:xfrm>
+            <a:off x="4143839" y="5999106"/>
+            <a:ext cx="2741393" cy="461665"/>
+          </a:xfrm>
+          <a:prstGeom prst="rect">
+            <a:avLst/>
+          </a:prstGeom>
+          <a:noFill/>
+        </p:spPr>
+        <p:txBody>
+          <a:bodyPr wrap="square">
+            <a:spAutoFit/>
+          </a:bodyPr>
+          <a:lstStyle/>
+          <a:p>
+            <a:pPr algn="ctr"/>
+            <a:r>
+              <a:rPr lang="en-US" sz="1200" dirty="0">
+                <a:effectLst/>
+                <a:latin typeface="Times New Roman" panose="02020603050405020304" pitchFamily="18" charset="0"/>
+                <a:ea typeface="SimSun" panose="02010600030101010101" pitchFamily="2" charset="-122"/>
+              </a:rPr>
+              <a:t>Figure </a:t>
+            </a:r>
+            <a:r>
+              <a:rPr lang="en-US" sz="1200" dirty="0">
+                <a:latin typeface="Times New Roman" panose="02020603050405020304" pitchFamily="18" charset="0"/>
+                <a:ea typeface="SimSun" panose="02010600030101010101" pitchFamily="2" charset="-122"/>
+              </a:rPr>
+              <a:t>7</a:t>
+            </a:r>
+            <a:r>
+              <a:rPr lang="en-US" sz="1200" dirty="0">
+                <a:effectLst/>
+                <a:latin typeface="Times New Roman" panose="02020603050405020304" pitchFamily="18" charset="0"/>
+                <a:ea typeface="SimSun" panose="02010600030101010101" pitchFamily="2" charset="-122"/>
+              </a:rPr>
+              <a:t>: Extracted Text from different image processing techniques</a:t>
+            </a:r>
+          </a:p>
+        </p:txBody>
+      </p:sp>
+      <p:sp>
+        <p:nvSpPr>
+          <p:cNvPr id="20" name="TextBox 19">
+            <a:extLst>
+              <a:ext uri="{FF2B5EF4-FFF2-40B4-BE49-F238E27FC236}">
+                <a16:creationId xmlns:a16="http://schemas.microsoft.com/office/drawing/2014/main" id="{525C9F0C-B847-2305-B275-84F6538E6CF8}"/>
+              </a:ext>
+            </a:extLst>
+          </p:cNvPr>
+          <p:cNvSpPr txBox="1"/>
+          <p:nvPr/>
+        </p:nvSpPr>
+        <p:spPr>
+          <a:xfrm>
+            <a:off x="7920791" y="5997755"/>
+            <a:ext cx="2741393" cy="461665"/>
+          </a:xfrm>
+          <a:prstGeom prst="rect">
+            <a:avLst/>
+          </a:prstGeom>
+          <a:noFill/>
+        </p:spPr>
+        <p:txBody>
+          <a:bodyPr wrap="square">
+            <a:spAutoFit/>
+          </a:bodyPr>
+          <a:lstStyle/>
+          <a:p>
+            <a:pPr algn="ctr"/>
+            <a:r>
+              <a:rPr lang="en-US" sz="1200" dirty="0">
+                <a:effectLst/>
+                <a:latin typeface="Times New Roman" panose="02020603050405020304" pitchFamily="18" charset="0"/>
+                <a:ea typeface="SimSun" panose="02010600030101010101" pitchFamily="2" charset="-122"/>
+              </a:rPr>
+              <a:t>Figure 8: Original Image and </a:t>
+            </a:r>
+            <a:r>
+              <a:rPr lang="en-US" sz="1200" dirty="0">
+                <a:latin typeface="Times New Roman" panose="02020603050405020304" pitchFamily="18" charset="0"/>
+                <a:ea typeface="SimSun" panose="02010600030101010101" pitchFamily="2" charset="-122"/>
+              </a:rPr>
+              <a:t>Image after applying different </a:t>
+            </a:r>
+            <a:r>
+              <a:rPr lang="en-US" sz="1200" dirty="0">
+                <a:effectLst/>
+                <a:latin typeface="Times New Roman" panose="02020603050405020304" pitchFamily="18" charset="0"/>
+                <a:ea typeface="SimSun" panose="02010600030101010101" pitchFamily="2" charset="-122"/>
+              </a:rPr>
+              <a:t>Processing techniques</a:t>
+            </a:r>
+          </a:p>
+        </p:txBody>
+      </p:sp>
+    </p:spTree>
+    <p:extLst>
+      <p:ext uri="{BB962C8B-B14F-4D97-AF65-F5344CB8AC3E}">
+        <p14:creationId xmlns:p14="http://schemas.microsoft.com/office/powerpoint/2010/main" val="4244308985"/>
+      </p:ext>
+    </p:extLst>
+  </p:cSld>
+  <p:clrMapOvr>
+    <a:masterClrMapping/>
+  </p:clrMapOvr>
+</p:sld>
+</file>
+
+<file path=ppt/slides/slide15.xml><?xml version="1.0" encoding="utf-8"?>
 <p:sld xmlns:a="http://schemas.openxmlformats.org/drawingml/2006/main" xmlns:r="http://schemas.openxmlformats.org/officeDocument/2006/relationships" xmlns:p="http://schemas.openxmlformats.org/presentationml/2006/main">
   <p:cSld>
     <p:bg>
@@ -20076,7 +21904,7 @@
           <p:nvPr/>
         </p:nvPicPr>
         <p:blipFill>
-          <a:blip r:embed="rId2"/>
+          <a:blip r:embed="rId3"/>
           <a:stretch>
             <a:fillRect/>
           </a:stretch>
@@ -20135,7 +21963,7 @@
         </p:xfrm>
         <a:graphic>
           <a:graphicData uri="http://schemas.openxmlformats.org/drawingml/2006/diagram">
-            <dgm:relIds xmlns:dgm="http://schemas.openxmlformats.org/drawingml/2006/diagram" xmlns:r="http://schemas.openxmlformats.org/officeDocument/2006/relationships" r:dm="rId3" r:lo="rId4" r:qs="rId5" r:cs="rId6"/>
+            <dgm:relIds xmlns:dgm="http://schemas.openxmlformats.org/drawingml/2006/diagram" xmlns:r="http://schemas.openxmlformats.org/officeDocument/2006/relationships" r:dm="rId4" r:lo="rId5" r:qs="rId6" r:cs="rId7"/>
           </a:graphicData>
         </a:graphic>
       </p:graphicFrame>
@@ -20542,7 +22370,7 @@
           <p:nvPr/>
         </p:nvPicPr>
         <p:blipFill>
-          <a:blip r:embed="rId2"/>
+          <a:blip r:embed="rId3"/>
           <a:stretch>
             <a:fillRect/>
           </a:stretch>
@@ -20599,7 +22427,7 @@
         </p:xfrm>
         <a:graphic>
           <a:graphicData uri="http://schemas.openxmlformats.org/drawingml/2006/diagram">
-            <dgm:relIds xmlns:dgm="http://schemas.openxmlformats.org/drawingml/2006/diagram" xmlns:r="http://schemas.openxmlformats.org/officeDocument/2006/relationships" r:dm="rId3" r:lo="rId4" r:qs="rId5" r:cs="rId6"/>
+            <dgm:relIds xmlns:dgm="http://schemas.openxmlformats.org/drawingml/2006/diagram" xmlns:r="http://schemas.openxmlformats.org/officeDocument/2006/relationships" r:dm="rId4" r:lo="rId5" r:qs="rId6" r:cs="rId7"/>
           </a:graphicData>
         </a:graphic>
       </p:graphicFrame>
@@ -20959,7 +22787,7 @@
           <p:nvPr/>
         </p:nvPicPr>
         <p:blipFill>
-          <a:blip r:embed="rId2"/>
+          <a:blip r:embed="rId3"/>
           <a:stretch>
             <a:fillRect/>
           </a:stretch>
@@ -21065,7 +22893,7 @@
           <p:nvPr/>
         </p:nvPicPr>
         <p:blipFill>
-          <a:blip r:embed="rId3">
+          <a:blip r:embed="rId4">
             <a:extLst>
               <a:ext uri="{28A0092B-C50C-407E-A947-70E740481C1C}">
                 <a14:useLocalDpi xmlns:a14="http://schemas.microsoft.com/office/drawing/2010/main" val="0"/>
@@ -21101,7 +22929,7 @@
         <p:spPr>
           <a:xfrm>
             <a:off x="414863" y="4200811"/>
-            <a:ext cx="10303443" cy="1938992"/>
+            <a:ext cx="10303443" cy="2239074"/>
           </a:xfrm>
           <a:prstGeom prst="rect">
             <a:avLst/>
@@ -21125,6 +22953,29 @@
                 <a:cs typeface="Times New Roman" panose="02020603050405020304" pitchFamily="18" charset="0"/>
               </a:rPr>
               <a:t>System Architecture</a:t>
+            </a:r>
+          </a:p>
+          <a:p>
+            <a:pPr marL="342900" indent="-342900" algn="just">
+              <a:lnSpc>
+                <a:spcPct val="150000"/>
+              </a:lnSpc>
+              <a:buFont typeface="+mj-lt"/>
+              <a:buAutoNum type="arabicPeriod"/>
+            </a:pPr>
+            <a:r>
+              <a:rPr lang="en-GB" sz="1300" b="1" dirty="0">
+                <a:latin typeface="Times New Roman" panose="02020603050405020304" pitchFamily="18" charset="0"/>
+                <a:cs typeface="Times New Roman" panose="02020603050405020304" pitchFamily="18" charset="0"/>
+              </a:rPr>
+              <a:t>Input handler: </a:t>
+            </a:r>
+            <a:r>
+              <a:rPr lang="en-GB" sz="1300" dirty="0">
+                <a:latin typeface="Times New Roman" panose="02020603050405020304" pitchFamily="18" charset="0"/>
+                <a:cs typeface="Times New Roman" panose="02020603050405020304" pitchFamily="18" charset="0"/>
+              </a:rPr>
+              <a:t>Manages folder paths, preprocessing methods, and various export formats for image processing.</a:t>
             </a:r>
           </a:p>
           <a:p>
@@ -22594,7 +24445,7 @@
           <p:nvPr/>
         </p:nvPicPr>
         <p:blipFill>
-          <a:blip r:embed="rId2"/>
+          <a:blip r:embed="rId3"/>
           <a:stretch>
             <a:fillRect/>
           </a:stretch>
@@ -23132,7 +24983,7 @@
           <p:nvPr/>
         </p:nvPicPr>
         <p:blipFill>
-          <a:blip r:embed="rId3">
+          <a:blip r:embed="rId4">
             <a:extLst>
               <a:ext uri="{28A0092B-C50C-407E-A947-70E740481C1C}">
                 <a14:useLocalDpi xmlns:a14="http://schemas.microsoft.com/office/drawing/2010/main" val="0"/>
@@ -23951,7 +25802,7 @@
           <p:nvPr/>
         </p:nvPicPr>
         <p:blipFill>
-          <a:blip r:embed="rId2"/>
+          <a:blip r:embed="rId3"/>
           <a:stretch>
             <a:fillRect/>
           </a:stretch>
@@ -23999,7 +25850,7 @@
           <p:nvPr/>
         </p:nvPicPr>
         <p:blipFill>
-          <a:blip r:embed="rId3">
+          <a:blip r:embed="rId4">
             <a:extLst>
               <a:ext uri="{28A0092B-C50C-407E-A947-70E740481C1C}">
                 <a14:useLocalDpi xmlns:a14="http://schemas.microsoft.com/office/drawing/2010/main" val="0"/>

</xml_diff>